<commit_message>
Supplementary slides of completed project
</commit_message>
<xml_diff>
--- a/presentation slides.pptx
+++ b/presentation slides.pptx
@@ -18,14 +18,13 @@
     <p:sldId id="266" r:id="rId12"/>
     <p:sldId id="267" r:id="rId13"/>
     <p:sldId id="268" r:id="rId14"/>
-    <p:sldId id="269" r:id="rId15"/>
-    <p:sldId id="270" r:id="rId16"/>
-    <p:sldId id="271" r:id="rId17"/>
-    <p:sldId id="273" r:id="rId18"/>
-    <p:sldId id="274" r:id="rId19"/>
-    <p:sldId id="275" r:id="rId20"/>
-    <p:sldId id="276" r:id="rId21"/>
-    <p:sldId id="277" r:id="rId22"/>
+    <p:sldId id="270" r:id="rId15"/>
+    <p:sldId id="271" r:id="rId16"/>
+    <p:sldId id="273" r:id="rId17"/>
+    <p:sldId id="274" r:id="rId18"/>
+    <p:sldId id="275" r:id="rId19"/>
+    <p:sldId id="276" r:id="rId20"/>
+    <p:sldId id="277" r:id="rId21"/>
   </p:sldIdLst>
   <p:sldSz cx="12192000" cy="6858000"/>
   <p:notesSz cx="6858000" cy="9144000"/>
@@ -467,7 +466,7 @@
           <a:p>
             <a:fld id="{358D7B62-A439-448B-8497-E9BE390861B9}" type="datetimeFigureOut">
               <a:rPr lang="en-US" smtClean="0"/>
-              <a:t>3/12/2019</a:t>
+              <a:t>3/15/2019</a:t>
             </a:fld>
             <a:endParaRPr lang="en-US"/>
           </a:p>
@@ -1555,7 +1554,7 @@
           <a:p>
             <a:fld id="{358D7B62-A439-448B-8497-E9BE390861B9}" type="datetimeFigureOut">
               <a:rPr lang="en-US" smtClean="0"/>
-              <a:t>3/12/2019</a:t>
+              <a:t>3/15/2019</a:t>
             </a:fld>
             <a:endParaRPr lang="en-US"/>
           </a:p>
@@ -2535,7 +2534,7 @@
           <a:p>
             <a:fld id="{358D7B62-A439-448B-8497-E9BE390861B9}" type="datetimeFigureOut">
               <a:rPr lang="en-US" smtClean="0"/>
-              <a:t>3/12/2019</a:t>
+              <a:t>3/15/2019</a:t>
             </a:fld>
             <a:endParaRPr lang="en-US"/>
           </a:p>
@@ -3669,7 +3668,7 @@
           <a:p>
             <a:fld id="{358D7B62-A439-448B-8497-E9BE390861B9}" type="datetimeFigureOut">
               <a:rPr lang="en-US" smtClean="0"/>
-              <a:t>3/12/2019</a:t>
+              <a:t>3/15/2019</a:t>
             </a:fld>
             <a:endParaRPr lang="en-US"/>
           </a:p>
@@ -4702,7 +4701,7 @@
           <a:p>
             <a:fld id="{358D7B62-A439-448B-8497-E9BE390861B9}" type="datetimeFigureOut">
               <a:rPr lang="en-US" smtClean="0"/>
-              <a:t>3/12/2019</a:t>
+              <a:t>3/15/2019</a:t>
             </a:fld>
             <a:endParaRPr lang="en-US"/>
           </a:p>
@@ -5362,7 +5361,7 @@
           <a:p>
             <a:fld id="{358D7B62-A439-448B-8497-E9BE390861B9}" type="datetimeFigureOut">
               <a:rPr lang="en-US" smtClean="0"/>
-              <a:t>3/12/2019</a:t>
+              <a:t>3/15/2019</a:t>
             </a:fld>
             <a:endParaRPr lang="en-US"/>
           </a:p>
@@ -6223,7 +6222,7 @@
           <a:p>
             <a:fld id="{358D7B62-A439-448B-8497-E9BE390861B9}" type="datetimeFigureOut">
               <a:rPr lang="en-US" smtClean="0"/>
-              <a:t>3/12/2019</a:t>
+              <a:t>3/15/2019</a:t>
             </a:fld>
             <a:endParaRPr lang="en-US"/>
           </a:p>
@@ -6413,7 +6412,7 @@
           <a:p>
             <a:fld id="{358D7B62-A439-448B-8497-E9BE390861B9}" type="datetimeFigureOut">
               <a:rPr lang="en-US" smtClean="0"/>
-              <a:t>3/12/2019</a:t>
+              <a:t>3/15/2019</a:t>
             </a:fld>
             <a:endParaRPr lang="en-US"/>
           </a:p>
@@ -7385,7 +7384,7 @@
           <a:p>
             <a:fld id="{358D7B62-A439-448B-8497-E9BE390861B9}" type="datetimeFigureOut">
               <a:rPr lang="en-US" smtClean="0"/>
-              <a:t>3/12/2019</a:t>
+              <a:t>3/15/2019</a:t>
             </a:fld>
             <a:endParaRPr lang="en-US"/>
           </a:p>
@@ -7596,7 +7595,7 @@
           <a:p>
             <a:fld id="{358D7B62-A439-448B-8497-E9BE390861B9}" type="datetimeFigureOut">
               <a:rPr lang="en-US" smtClean="0"/>
-              <a:t>3/12/2019</a:t>
+              <a:t>3/15/2019</a:t>
             </a:fld>
             <a:endParaRPr lang="en-US"/>
           </a:p>
@@ -8630,7 +8629,7 @@
           <a:p>
             <a:fld id="{358D7B62-A439-448B-8497-E9BE390861B9}" type="datetimeFigureOut">
               <a:rPr lang="en-US" smtClean="0"/>
-              <a:t>3/12/2019</a:t>
+              <a:t>3/15/2019</a:t>
             </a:fld>
             <a:endParaRPr lang="en-US"/>
           </a:p>
@@ -8902,7 +8901,7 @@
           <a:p>
             <a:fld id="{358D7B62-A439-448B-8497-E9BE390861B9}" type="datetimeFigureOut">
               <a:rPr lang="en-US" smtClean="0"/>
-              <a:t>3/12/2019</a:t>
+              <a:t>3/15/2019</a:t>
             </a:fld>
             <a:endParaRPr lang="en-US"/>
           </a:p>
@@ -9312,7 +9311,7 @@
           <a:p>
             <a:fld id="{358D7B62-A439-448B-8497-E9BE390861B9}" type="datetimeFigureOut">
               <a:rPr lang="en-US" smtClean="0"/>
-              <a:t>3/12/2019</a:t>
+              <a:t>3/15/2019</a:t>
             </a:fld>
             <a:endParaRPr lang="en-US"/>
           </a:p>
@@ -9439,7 +9438,7 @@
           <a:p>
             <a:fld id="{358D7B62-A439-448B-8497-E9BE390861B9}" type="datetimeFigureOut">
               <a:rPr lang="en-US" smtClean="0"/>
-              <a:t>3/12/2019</a:t>
+              <a:t>3/15/2019</a:t>
             </a:fld>
             <a:endParaRPr lang="en-US"/>
           </a:p>
@@ -9534,7 +9533,7 @@
           <a:p>
             <a:fld id="{358D7B62-A439-448B-8497-E9BE390861B9}" type="datetimeFigureOut">
               <a:rPr lang="en-US" smtClean="0"/>
-              <a:t>3/12/2019</a:t>
+              <a:t>3/15/2019</a:t>
             </a:fld>
             <a:endParaRPr lang="en-US"/>
           </a:p>
@@ -10615,7 +10614,7 @@
           <a:p>
             <a:fld id="{358D7B62-A439-448B-8497-E9BE390861B9}" type="datetimeFigureOut">
               <a:rPr lang="en-US" smtClean="0"/>
-              <a:t>3/12/2019</a:t>
+              <a:t>3/15/2019</a:t>
             </a:fld>
             <a:endParaRPr lang="en-US"/>
           </a:p>
@@ -11723,7 +11722,7 @@
           <a:p>
             <a:fld id="{358D7B62-A439-448B-8497-E9BE390861B9}" type="datetimeFigureOut">
               <a:rPr lang="en-US" smtClean="0"/>
-              <a:t>3/12/2019</a:t>
+              <a:t>3/15/2019</a:t>
             </a:fld>
             <a:endParaRPr lang="en-US"/>
           </a:p>
@@ -12720,7 +12719,7 @@
           <a:p>
             <a:fld id="{358D7B62-A439-448B-8497-E9BE390861B9}" type="datetimeFigureOut">
               <a:rPr lang="en-US" smtClean="0"/>
-              <a:t>3/12/2019</a:t>
+              <a:t>3/15/2019</a:t>
             </a:fld>
             <a:endParaRPr lang="en-US"/>
           </a:p>
@@ -13922,112 +13921,6 @@
           <p:cNvPr id="2" name="Title 1">
             <a:extLst>
               <a:ext uri="{FF2B5EF4-FFF2-40B4-BE49-F238E27FC236}">
-                <a16:creationId xmlns:a16="http://schemas.microsoft.com/office/drawing/2014/main" id="{710ABFEE-CF8B-4D09-B972-3F5EAE145CDC}"/>
-              </a:ext>
-            </a:extLst>
-          </p:cNvPr>
-          <p:cNvSpPr>
-            <a:spLocks noGrp="1"/>
-          </p:cNvSpPr>
-          <p:nvPr>
-            <p:ph type="title"/>
-          </p:nvPr>
-        </p:nvSpPr>
-        <p:spPr/>
-        <p:txBody>
-          <a:bodyPr/>
-          <a:lstStyle/>
-          <a:p>
-            <a:r>
-              <a:rPr lang="en-US" dirty="0"/>
-              <a:t>Summary of Heatmap Visualization</a:t>
-            </a:r>
-          </a:p>
-        </p:txBody>
-      </p:sp>
-      <p:sp>
-        <p:nvSpPr>
-          <p:cNvPr id="3" name="Content Placeholder 2">
-            <a:extLst>
-              <a:ext uri="{FF2B5EF4-FFF2-40B4-BE49-F238E27FC236}">
-                <a16:creationId xmlns:a16="http://schemas.microsoft.com/office/drawing/2014/main" id="{55960357-E593-4E64-A390-2DF759CBFDB9}"/>
-              </a:ext>
-            </a:extLst>
-          </p:cNvPr>
-          <p:cNvSpPr>
-            <a:spLocks noGrp="1"/>
-          </p:cNvSpPr>
-          <p:nvPr>
-            <p:ph idx="1"/>
-          </p:nvPr>
-        </p:nvSpPr>
-        <p:spPr/>
-        <p:txBody>
-          <a:bodyPr/>
-          <a:lstStyle/>
-          <a:p>
-            <a:r>
-              <a:rPr lang="en-US" dirty="0"/>
-              <a:t>The feature variables shown in the samples of bad trends were dropped from the </a:t>
-            </a:r>
-            <a:r>
-              <a:rPr lang="en-US" dirty="0" err="1"/>
-              <a:t>dataframe</a:t>
-            </a:r>
-            <a:r>
-              <a:rPr lang="en-US" dirty="0"/>
-              <a:t>. This left a total of 12 feature variables to continue to be analyzed.</a:t>
-            </a:r>
-          </a:p>
-          <a:p>
-            <a:r>
-              <a:rPr lang="en-US" dirty="0"/>
-              <a:t>Remaining variables looked promising in a qualitative sense</a:t>
-            </a:r>
-          </a:p>
-          <a:p>
-            <a:r>
-              <a:rPr lang="en-US" dirty="0"/>
-              <a:t>Proceed with a quantitative measure to ascertain correlation promise</a:t>
-            </a:r>
-          </a:p>
-        </p:txBody>
-      </p:sp>
-    </p:spTree>
-    <p:extLst>
-      <p:ext uri="{BB962C8B-B14F-4D97-AF65-F5344CB8AC3E}">
-        <p14:creationId xmlns:p14="http://schemas.microsoft.com/office/powerpoint/2010/main" val="56598457"/>
-      </p:ext>
-    </p:extLst>
-  </p:cSld>
-  <p:clrMapOvr>
-    <a:masterClrMapping/>
-  </p:clrMapOvr>
-</p:sld>
-</file>
-
-<file path=ppt/slides/slide15.xml><?xml version="1.0" encoding="utf-8"?>
-<p:sld xmlns:a="http://schemas.openxmlformats.org/drawingml/2006/main" xmlns:r="http://schemas.openxmlformats.org/officeDocument/2006/relationships" xmlns:p="http://schemas.openxmlformats.org/presentationml/2006/main">
-  <p:cSld>
-    <p:spTree>
-      <p:nvGrpSpPr>
-        <p:cNvPr id="1" name=""/>
-        <p:cNvGrpSpPr/>
-        <p:nvPr/>
-      </p:nvGrpSpPr>
-      <p:grpSpPr>
-        <a:xfrm>
-          <a:off x="0" y="0"/>
-          <a:ext cx="0" cy="0"/>
-          <a:chOff x="0" y="0"/>
-          <a:chExt cx="0" cy="0"/>
-        </a:xfrm>
-      </p:grpSpPr>
-      <p:sp>
-        <p:nvSpPr>
-          <p:cNvPr id="2" name="Title 1">
-            <a:extLst>
-              <a:ext uri="{FF2B5EF4-FFF2-40B4-BE49-F238E27FC236}">
                 <a16:creationId xmlns:a16="http://schemas.microsoft.com/office/drawing/2014/main" id="{0CA88CDF-99AF-4962-BD71-B76520C8716B}"/>
               </a:ext>
             </a:extLst>
@@ -14145,7 +14038,7 @@
 </p:sld>
 </file>
 
-<file path=ppt/slides/slide16.xml><?xml version="1.0" encoding="utf-8"?>
+<file path=ppt/slides/slide15.xml><?xml version="1.0" encoding="utf-8"?>
 <p:sld xmlns:a="http://schemas.openxmlformats.org/drawingml/2006/main" xmlns:r="http://schemas.openxmlformats.org/officeDocument/2006/relationships" xmlns:p="http://schemas.openxmlformats.org/presentationml/2006/main">
   <p:cSld>
     <p:spTree>
@@ -14268,7 +14161,7 @@
 </p:sld>
 </file>
 
-<file path=ppt/slides/slide17.xml><?xml version="1.0" encoding="utf-8"?>
+<file path=ppt/slides/slide16.xml><?xml version="1.0" encoding="utf-8"?>
 <p:sld xmlns:a="http://schemas.openxmlformats.org/drawingml/2006/main" xmlns:r="http://schemas.openxmlformats.org/officeDocument/2006/relationships" xmlns:p="http://schemas.openxmlformats.org/presentationml/2006/main">
   <p:cSld>
     <p:spTree>
@@ -14329,10 +14222,15 @@
             <p:ph idx="1"/>
           </p:nvPr>
         </p:nvSpPr>
-        <p:spPr/>
+        <p:spPr>
+          <a:xfrm>
+            <a:off x="1154955" y="2603500"/>
+            <a:ext cx="5139314" cy="3416300"/>
+          </a:xfrm>
+        </p:spPr>
         <p:txBody>
           <a:bodyPr>
-            <a:normAutofit lnSpcReduction="10000"/>
+            <a:normAutofit fontScale="92500" lnSpcReduction="10000"/>
           </a:bodyPr>
           <a:lstStyle/>
           <a:p>
@@ -14395,6 +14293,42 @@
           </a:p>
         </p:txBody>
       </p:sp>
+      <p:pic>
+        <p:nvPicPr>
+          <p:cNvPr id="5" name="Picture 4">
+            <a:extLst>
+              <a:ext uri="{FF2B5EF4-FFF2-40B4-BE49-F238E27FC236}">
+                <a16:creationId xmlns:a16="http://schemas.microsoft.com/office/drawing/2014/main" id="{E767316C-4B23-4F53-AAD1-89044C6F7558}"/>
+              </a:ext>
+            </a:extLst>
+          </p:cNvPr>
+          <p:cNvPicPr>
+            <a:picLocks noChangeAspect="1"/>
+          </p:cNvPicPr>
+          <p:nvPr/>
+        </p:nvPicPr>
+        <p:blipFill>
+          <a:blip r:embed="rId2">
+            <a:extLst>
+              <a:ext uri="{28A0092B-C50C-407E-A947-70E740481C1C}">
+                <a14:useLocalDpi xmlns:a14="http://schemas.microsoft.com/office/drawing/2010/main" val="0"/>
+              </a:ext>
+            </a:extLst>
+          </a:blip>
+          <a:stretch>
+            <a:fillRect/>
+          </a:stretch>
+        </p:blipFill>
+        <p:spPr>
+          <a:xfrm>
+            <a:off x="7313719" y="2603500"/>
+            <a:ext cx="3952044" cy="3801123"/>
+          </a:xfrm>
+          <a:prstGeom prst="rect">
+            <a:avLst/>
+          </a:prstGeom>
+        </p:spPr>
+      </p:pic>
     </p:spTree>
     <p:extLst>
       <p:ext uri="{BB962C8B-B14F-4D97-AF65-F5344CB8AC3E}">
@@ -14408,7 +14342,7 @@
 </p:sld>
 </file>
 
-<file path=ppt/slides/slide18.xml><?xml version="1.0" encoding="utf-8"?>
+<file path=ppt/slides/slide17.xml><?xml version="1.0" encoding="utf-8"?>
 <p:sld xmlns:a="http://schemas.openxmlformats.org/drawingml/2006/main" xmlns:r="http://schemas.openxmlformats.org/officeDocument/2006/relationships" xmlns:p="http://schemas.openxmlformats.org/presentationml/2006/main">
   <p:cSld>
     <p:spTree>
@@ -14537,7 +14471,7 @@
 </p:sld>
 </file>
 
-<file path=ppt/slides/slide19.xml><?xml version="1.0" encoding="utf-8"?>
+<file path=ppt/slides/slide18.xml><?xml version="1.0" encoding="utf-8"?>
 <p:sld xmlns:a="http://schemas.openxmlformats.org/drawingml/2006/main" xmlns:r="http://schemas.openxmlformats.org/officeDocument/2006/relationships" xmlns:p="http://schemas.openxmlformats.org/presentationml/2006/main">
   <p:cSld>
     <p:spTree>
@@ -14705,6 +14639,159 @@
     <p:extLst>
       <p:ext uri="{BB962C8B-B14F-4D97-AF65-F5344CB8AC3E}">
         <p14:creationId xmlns:p14="http://schemas.microsoft.com/office/powerpoint/2010/main" val="2523739770"/>
+      </p:ext>
+    </p:extLst>
+  </p:cSld>
+  <p:clrMapOvr>
+    <a:masterClrMapping/>
+  </p:clrMapOvr>
+</p:sld>
+</file>
+
+<file path=ppt/slides/slide19.xml><?xml version="1.0" encoding="utf-8"?>
+<p:sld xmlns:a="http://schemas.openxmlformats.org/drawingml/2006/main" xmlns:r="http://schemas.openxmlformats.org/officeDocument/2006/relationships" xmlns:p="http://schemas.openxmlformats.org/presentationml/2006/main">
+  <p:cSld>
+    <p:spTree>
+      <p:nvGrpSpPr>
+        <p:cNvPr id="1" name=""/>
+        <p:cNvGrpSpPr/>
+        <p:nvPr/>
+      </p:nvGrpSpPr>
+      <p:grpSpPr>
+        <a:xfrm>
+          <a:off x="0" y="0"/>
+          <a:ext cx="0" cy="0"/>
+          <a:chOff x="0" y="0"/>
+          <a:chExt cx="0" cy="0"/>
+        </a:xfrm>
+      </p:grpSpPr>
+      <p:sp>
+        <p:nvSpPr>
+          <p:cNvPr id="2" name="Title 1">
+            <a:extLst>
+              <a:ext uri="{FF2B5EF4-FFF2-40B4-BE49-F238E27FC236}">
+                <a16:creationId xmlns:a16="http://schemas.microsoft.com/office/drawing/2014/main" id="{5653A159-2F5A-42C6-8370-A10BA67D7E89}"/>
+              </a:ext>
+            </a:extLst>
+          </p:cNvPr>
+          <p:cNvSpPr>
+            <a:spLocks noGrp="1"/>
+          </p:cNvSpPr>
+          <p:nvPr>
+            <p:ph type="title"/>
+          </p:nvPr>
+        </p:nvSpPr>
+        <p:spPr/>
+        <p:txBody>
+          <a:bodyPr/>
+          <a:lstStyle/>
+          <a:p>
+            <a:r>
+              <a:rPr lang="en-US" dirty="0"/>
+              <a:t>Feature Importance</a:t>
+            </a:r>
+          </a:p>
+        </p:txBody>
+      </p:sp>
+      <p:sp>
+        <p:nvSpPr>
+          <p:cNvPr id="3" name="Content Placeholder 2">
+            <a:extLst>
+              <a:ext uri="{FF2B5EF4-FFF2-40B4-BE49-F238E27FC236}">
+                <a16:creationId xmlns:a16="http://schemas.microsoft.com/office/drawing/2014/main" id="{D17EFF23-AAB8-4D1B-AC50-52884351953C}"/>
+              </a:ext>
+            </a:extLst>
+          </p:cNvPr>
+          <p:cNvSpPr>
+            <a:spLocks noGrp="1"/>
+          </p:cNvSpPr>
+          <p:nvPr>
+            <p:ph idx="1"/>
+          </p:nvPr>
+        </p:nvSpPr>
+        <p:spPr>
+          <a:xfrm>
+            <a:off x="1154954" y="2603500"/>
+            <a:ext cx="4047361" cy="3416300"/>
+          </a:xfrm>
+        </p:spPr>
+        <p:txBody>
+          <a:bodyPr>
+            <a:normAutofit lnSpcReduction="10000"/>
+          </a:bodyPr>
+          <a:lstStyle/>
+          <a:p>
+            <a:r>
+              <a:rPr lang="en-US" dirty="0"/>
+              <a:t>The suggested feature importance as determined by the Decision Tree is shown to the right. The clear biggest impactors are ‘AF_EXAC’ and ‘AF_TGP’</a:t>
+            </a:r>
+          </a:p>
+          <a:p>
+            <a:r>
+              <a:rPr lang="en-US" dirty="0"/>
+              <a:t>By the </a:t>
+            </a:r>
+            <a:r>
+              <a:rPr lang="en-US" dirty="0" err="1"/>
+              <a:t>datasets’</a:t>
+            </a:r>
+            <a:r>
+              <a:rPr lang="en-US" dirty="0"/>
+              <a:t> definition of feature variables, these are the </a:t>
+            </a:r>
+            <a:r>
+              <a:rPr lang="en-US" i="1" dirty="0"/>
+              <a:t>allele frequencies </a:t>
+            </a:r>
+            <a:r>
+              <a:rPr lang="en-US" dirty="0"/>
+              <a:t>as defined by two of the three participating labs (</a:t>
+            </a:r>
+            <a:r>
+              <a:rPr lang="en-US" dirty="0" err="1"/>
+              <a:t>ExAC</a:t>
+            </a:r>
+            <a:r>
+              <a:rPr lang="en-US" dirty="0"/>
+              <a:t> and 1000 Genome Project). </a:t>
+            </a:r>
+          </a:p>
+        </p:txBody>
+      </p:sp>
+      <p:pic>
+        <p:nvPicPr>
+          <p:cNvPr id="4" name="image10.png">
+            <a:extLst>
+              <a:ext uri="{FF2B5EF4-FFF2-40B4-BE49-F238E27FC236}">
+                <a16:creationId xmlns:a16="http://schemas.microsoft.com/office/drawing/2014/main" id="{5F114DC8-89A0-4B89-962C-89B343C10750}"/>
+              </a:ext>
+            </a:extLst>
+          </p:cNvPr>
+          <p:cNvPicPr/>
+          <p:nvPr/>
+        </p:nvPicPr>
+        <p:blipFill>
+          <a:blip r:embed="rId2"/>
+          <a:srcRect/>
+          <a:stretch>
+            <a:fillRect/>
+          </a:stretch>
+        </p:blipFill>
+        <p:spPr>
+          <a:xfrm>
+            <a:off x="5024761" y="2527465"/>
+            <a:ext cx="6604985" cy="3568370"/>
+          </a:xfrm>
+          <a:prstGeom prst="rect">
+            <a:avLst/>
+          </a:prstGeom>
+          <a:ln/>
+        </p:spPr>
+      </p:pic>
+    </p:spTree>
+    <p:extLst>
+      <p:ext uri="{BB962C8B-B14F-4D97-AF65-F5344CB8AC3E}">
+        <p14:creationId xmlns:p14="http://schemas.microsoft.com/office/powerpoint/2010/main" val="2118436131"/>
       </p:ext>
     </p:extLst>
   </p:cSld>
@@ -14775,9 +14862,16 @@
             <p:ph idx="1"/>
           </p:nvPr>
         </p:nvSpPr>
-        <p:spPr/>
+        <p:spPr>
+          <a:xfrm>
+            <a:off x="1154955" y="2603500"/>
+            <a:ext cx="5991570" cy="3416300"/>
+          </a:xfrm>
+        </p:spPr>
         <p:txBody>
-          <a:bodyPr/>
+          <a:bodyPr>
+            <a:normAutofit fontScale="92500"/>
+          </a:bodyPr>
           <a:lstStyle/>
           <a:p>
             <a:r>
@@ -14820,6 +14914,42 @@
           </a:p>
         </p:txBody>
       </p:sp>
+      <p:pic>
+        <p:nvPicPr>
+          <p:cNvPr id="5" name="Picture 4">
+            <a:extLst>
+              <a:ext uri="{FF2B5EF4-FFF2-40B4-BE49-F238E27FC236}">
+                <a16:creationId xmlns:a16="http://schemas.microsoft.com/office/drawing/2014/main" id="{004B3B48-BF20-4DBC-88FB-A44AFEABF87E}"/>
+              </a:ext>
+            </a:extLst>
+          </p:cNvPr>
+          <p:cNvPicPr>
+            <a:picLocks noChangeAspect="1"/>
+          </p:cNvPicPr>
+          <p:nvPr/>
+        </p:nvPicPr>
+        <p:blipFill>
+          <a:blip r:embed="rId2">
+            <a:extLst>
+              <a:ext uri="{28A0092B-C50C-407E-A947-70E740481C1C}">
+                <a14:useLocalDpi xmlns:a14="http://schemas.microsoft.com/office/drawing/2010/main" val="0"/>
+              </a:ext>
+            </a:extLst>
+          </a:blip>
+          <a:stretch>
+            <a:fillRect/>
+          </a:stretch>
+        </p:blipFill>
+        <p:spPr>
+          <a:xfrm>
+            <a:off x="7146525" y="2283514"/>
+            <a:ext cx="4785065" cy="4459075"/>
+          </a:xfrm>
+          <a:prstGeom prst="rect">
+            <a:avLst/>
+          </a:prstGeom>
+        </p:spPr>
+      </p:pic>
     </p:spTree>
     <p:extLst>
       <p:ext uri="{BB962C8B-B14F-4D97-AF65-F5344CB8AC3E}">
@@ -14834,159 +14964,6 @@
 </file>
 
 <file path=ppt/slides/slide20.xml><?xml version="1.0" encoding="utf-8"?>
-<p:sld xmlns:a="http://schemas.openxmlformats.org/drawingml/2006/main" xmlns:r="http://schemas.openxmlformats.org/officeDocument/2006/relationships" xmlns:p="http://schemas.openxmlformats.org/presentationml/2006/main">
-  <p:cSld>
-    <p:spTree>
-      <p:nvGrpSpPr>
-        <p:cNvPr id="1" name=""/>
-        <p:cNvGrpSpPr/>
-        <p:nvPr/>
-      </p:nvGrpSpPr>
-      <p:grpSpPr>
-        <a:xfrm>
-          <a:off x="0" y="0"/>
-          <a:ext cx="0" cy="0"/>
-          <a:chOff x="0" y="0"/>
-          <a:chExt cx="0" cy="0"/>
-        </a:xfrm>
-      </p:grpSpPr>
-      <p:sp>
-        <p:nvSpPr>
-          <p:cNvPr id="2" name="Title 1">
-            <a:extLst>
-              <a:ext uri="{FF2B5EF4-FFF2-40B4-BE49-F238E27FC236}">
-                <a16:creationId xmlns:a16="http://schemas.microsoft.com/office/drawing/2014/main" id="{5653A159-2F5A-42C6-8370-A10BA67D7E89}"/>
-              </a:ext>
-            </a:extLst>
-          </p:cNvPr>
-          <p:cNvSpPr>
-            <a:spLocks noGrp="1"/>
-          </p:cNvSpPr>
-          <p:nvPr>
-            <p:ph type="title"/>
-          </p:nvPr>
-        </p:nvSpPr>
-        <p:spPr/>
-        <p:txBody>
-          <a:bodyPr/>
-          <a:lstStyle/>
-          <a:p>
-            <a:r>
-              <a:rPr lang="en-US" dirty="0"/>
-              <a:t>Feature Importance</a:t>
-            </a:r>
-          </a:p>
-        </p:txBody>
-      </p:sp>
-      <p:sp>
-        <p:nvSpPr>
-          <p:cNvPr id="3" name="Content Placeholder 2">
-            <a:extLst>
-              <a:ext uri="{FF2B5EF4-FFF2-40B4-BE49-F238E27FC236}">
-                <a16:creationId xmlns:a16="http://schemas.microsoft.com/office/drawing/2014/main" id="{D17EFF23-AAB8-4D1B-AC50-52884351953C}"/>
-              </a:ext>
-            </a:extLst>
-          </p:cNvPr>
-          <p:cNvSpPr>
-            <a:spLocks noGrp="1"/>
-          </p:cNvSpPr>
-          <p:nvPr>
-            <p:ph idx="1"/>
-          </p:nvPr>
-        </p:nvSpPr>
-        <p:spPr>
-          <a:xfrm>
-            <a:off x="1154954" y="2603500"/>
-            <a:ext cx="4047361" cy="3416300"/>
-          </a:xfrm>
-        </p:spPr>
-        <p:txBody>
-          <a:bodyPr>
-            <a:normAutofit lnSpcReduction="10000"/>
-          </a:bodyPr>
-          <a:lstStyle/>
-          <a:p>
-            <a:r>
-              <a:rPr lang="en-US" dirty="0"/>
-              <a:t>The suggested feature importance as determined by the Decision Tree is shown to the right. The clear biggest impactors are ‘AF_EXAC’ and ‘AF_TGP’</a:t>
-            </a:r>
-          </a:p>
-          <a:p>
-            <a:r>
-              <a:rPr lang="en-US" dirty="0"/>
-              <a:t>By the </a:t>
-            </a:r>
-            <a:r>
-              <a:rPr lang="en-US" dirty="0" err="1"/>
-              <a:t>datasets’</a:t>
-            </a:r>
-            <a:r>
-              <a:rPr lang="en-US" dirty="0"/>
-              <a:t> definition of feature variables, these are the </a:t>
-            </a:r>
-            <a:r>
-              <a:rPr lang="en-US" i="1" dirty="0"/>
-              <a:t>allele frequencies </a:t>
-            </a:r>
-            <a:r>
-              <a:rPr lang="en-US" dirty="0"/>
-              <a:t>as defined by two of the three participating labs (</a:t>
-            </a:r>
-            <a:r>
-              <a:rPr lang="en-US" dirty="0" err="1"/>
-              <a:t>ExAC</a:t>
-            </a:r>
-            <a:r>
-              <a:rPr lang="en-US" dirty="0"/>
-              <a:t> and 1000 Genome Project). </a:t>
-            </a:r>
-          </a:p>
-        </p:txBody>
-      </p:sp>
-      <p:pic>
-        <p:nvPicPr>
-          <p:cNvPr id="4" name="image10.png">
-            <a:extLst>
-              <a:ext uri="{FF2B5EF4-FFF2-40B4-BE49-F238E27FC236}">
-                <a16:creationId xmlns:a16="http://schemas.microsoft.com/office/drawing/2014/main" id="{5F114DC8-89A0-4B89-962C-89B343C10750}"/>
-              </a:ext>
-            </a:extLst>
-          </p:cNvPr>
-          <p:cNvPicPr/>
-          <p:nvPr/>
-        </p:nvPicPr>
-        <p:blipFill>
-          <a:blip r:embed="rId2"/>
-          <a:srcRect/>
-          <a:stretch>
-            <a:fillRect/>
-          </a:stretch>
-        </p:blipFill>
-        <p:spPr>
-          <a:xfrm>
-            <a:off x="5024761" y="2527465"/>
-            <a:ext cx="6604985" cy="3568370"/>
-          </a:xfrm>
-          <a:prstGeom prst="rect">
-            <a:avLst/>
-          </a:prstGeom>
-          <a:ln/>
-        </p:spPr>
-      </p:pic>
-    </p:spTree>
-    <p:extLst>
-      <p:ext uri="{BB962C8B-B14F-4D97-AF65-F5344CB8AC3E}">
-        <p14:creationId xmlns:p14="http://schemas.microsoft.com/office/powerpoint/2010/main" val="2118436131"/>
-      </p:ext>
-    </p:extLst>
-  </p:cSld>
-  <p:clrMapOvr>
-    <a:masterClrMapping/>
-  </p:clrMapOvr>
-</p:sld>
-</file>
-
-<file path=ppt/slides/slide21.xml><?xml version="1.0" encoding="utf-8"?>
 <p:sld xmlns:a="http://schemas.openxmlformats.org/drawingml/2006/main" xmlns:r="http://schemas.openxmlformats.org/officeDocument/2006/relationships" xmlns:p="http://schemas.openxmlformats.org/presentationml/2006/main">
   <p:cSld>
     <p:spTree>
@@ -15050,13 +15027,13 @@
         <p:spPr/>
         <p:txBody>
           <a:bodyPr>
-            <a:normAutofit lnSpcReduction="10000"/>
+            <a:normAutofit fontScale="92500" lnSpcReduction="10000"/>
           </a:bodyPr>
           <a:lstStyle/>
           <a:p>
             <a:r>
               <a:rPr lang="en-US" dirty="0"/>
-              <a:t>The two feature variables ‘AF_EXAC’ and ‘AF_TGP’ consistently had the biggest impact on more than one model’s prediction.</a:t>
+              <a:t>The model determined that the two feature variables ‘AF_EXAC’ and ‘AF_TGP’ consistently had the biggest impact on more than one model’s prediction.</a:t>
             </a:r>
           </a:p>
           <a:p>
@@ -15070,36 +15047,36 @@
             </a:r>
             <a:r>
               <a:rPr lang="en-US" dirty="0"/>
-              <a:t> and 1000 Genome Project (TGP), meaning that the third lab’s allele frequency observations did not have as much of an impact on the outcome of the classification agreement/disagreement.</a:t>
-            </a:r>
-          </a:p>
-          <a:p>
-            <a:r>
-              <a:rPr lang="en-US" dirty="0"/>
+              <a:t> and 1000 Genome Project (TGP), directly implying that the third lab’s allele frequency observations did not have as much of an impact on the outcome of the classification agreement/disagreement.</a:t>
+            </a:r>
+          </a:p>
+          <a:p>
+            <a:r>
+              <a:rPr lang="en-US" b="1" dirty="0"/>
               <a:t>The </a:t>
             </a:r>
             <a:r>
-              <a:rPr lang="en-US" i="1" dirty="0"/>
+              <a:rPr lang="en-US" b="1" i="1" dirty="0"/>
               <a:t>total </a:t>
             </a:r>
             <a:r>
-              <a:rPr lang="en-US" dirty="0"/>
+              <a:rPr lang="en-US" b="1" dirty="0"/>
               <a:t>laboratory agreement hinged upon these two labs. If </a:t>
             </a:r>
             <a:r>
-              <a:rPr lang="en-US" dirty="0" err="1"/>
+              <a:rPr lang="en-US" b="1" dirty="0" err="1"/>
               <a:t>ExAC</a:t>
             </a:r>
             <a:r>
-              <a:rPr lang="en-US" dirty="0"/>
-              <a:t> and TGP agreed on a genetic variants’ classification (due to their allele frequency measurement), the binary variable would likely take on a value of 0, meaning </a:t>
-            </a:r>
-            <a:r>
-              <a:rPr lang="en-US" i="1" dirty="0"/>
+              <a:rPr lang="en-US" b="1" dirty="0"/>
+              <a:t> and TGP agreed on a genetic variants’ classification (due in part to their allele frequency measurement), the binary variable would likely take on a value of 0, meaning </a:t>
+            </a:r>
+            <a:r>
+              <a:rPr lang="en-US" b="1" i="1" dirty="0"/>
               <a:t>all </a:t>
             </a:r>
             <a:r>
-              <a:rPr lang="en-US" dirty="0"/>
+              <a:rPr lang="en-US" b="1" dirty="0"/>
               <a:t>three labs agreed on the classification (the third lab GO-ESP agreed on their classification).</a:t>
             </a:r>
           </a:p>
@@ -15179,10 +15156,15 @@
             <p:ph idx="1"/>
           </p:nvPr>
         </p:nvSpPr>
-        <p:spPr/>
+        <p:spPr>
+          <a:xfrm>
+            <a:off x="6498454" y="2603500"/>
+            <a:ext cx="4964730" cy="3416300"/>
+          </a:xfrm>
+        </p:spPr>
         <p:txBody>
           <a:bodyPr>
-            <a:normAutofit lnSpcReduction="10000"/>
+            <a:normAutofit fontScale="85000" lnSpcReduction="20000"/>
           </a:bodyPr>
           <a:lstStyle/>
           <a:p>
@@ -15225,6 +15207,42 @@
           </a:p>
         </p:txBody>
       </p:sp>
+      <p:pic>
+        <p:nvPicPr>
+          <p:cNvPr id="5" name="Picture 4">
+            <a:extLst>
+              <a:ext uri="{FF2B5EF4-FFF2-40B4-BE49-F238E27FC236}">
+                <a16:creationId xmlns:a16="http://schemas.microsoft.com/office/drawing/2014/main" id="{4BEC8791-3619-407F-84D8-6204C04D01B0}"/>
+              </a:ext>
+            </a:extLst>
+          </p:cNvPr>
+          <p:cNvPicPr>
+            <a:picLocks noChangeAspect="1"/>
+          </p:cNvPicPr>
+          <p:nvPr/>
+        </p:nvPicPr>
+        <p:blipFill>
+          <a:blip r:embed="rId2">
+            <a:extLst>
+              <a:ext uri="{28A0092B-C50C-407E-A947-70E740481C1C}">
+                <a14:useLocalDpi xmlns:a14="http://schemas.microsoft.com/office/drawing/2010/main" val="0"/>
+              </a:ext>
+            </a:extLst>
+          </a:blip>
+          <a:stretch>
+            <a:fillRect/>
+          </a:stretch>
+        </p:blipFill>
+        <p:spPr>
+          <a:xfrm>
+            <a:off x="728815" y="2479783"/>
+            <a:ext cx="5176212" cy="3416300"/>
+          </a:xfrm>
+          <a:prstGeom prst="rect">
+            <a:avLst/>
+          </a:prstGeom>
+        </p:spPr>
+      </p:pic>
     </p:spTree>
     <p:extLst>
       <p:ext uri="{BB962C8B-B14F-4D97-AF65-F5344CB8AC3E}">

</xml_diff>